<commit_message>
middle update to presentation
</commit_message>
<xml_diff>
--- a/Documentation/DiagramPresentation.pptx
+++ b/Documentation/DiagramPresentation.pptx
@@ -11,6 +11,13 @@
     <p:sldId id="259" r:id="rId5"/>
     <p:sldId id="260" r:id="rId6"/>
     <p:sldId id="261" r:id="rId7"/>
+    <p:sldId id="266" r:id="rId8"/>
+    <p:sldId id="262" r:id="rId9"/>
+    <p:sldId id="263" r:id="rId10"/>
+    <p:sldId id="267" r:id="rId11"/>
+    <p:sldId id="268" r:id="rId12"/>
+    <p:sldId id="265" r:id="rId13"/>
+    <p:sldId id="264" r:id="rId14"/>
   </p:sldIdLst>
   <p:sldSz cx="12192000" cy="6858000"/>
   <p:notesSz cx="6858000" cy="9144000"/>
@@ -4603,6 +4610,923 @@
 </p:sld>
 </file>
 
+<file path=ppt/slides/slide10.xml><?xml version="1.0" encoding="utf-8"?>
+<p:sld xmlns:a="http://schemas.openxmlformats.org/drawingml/2006/main" xmlns:r="http://schemas.openxmlformats.org/officeDocument/2006/relationships" xmlns:p="http://schemas.openxmlformats.org/presentationml/2006/main">
+  <p:cSld>
+    <p:spTree>
+      <p:nvGrpSpPr>
+        <p:cNvPr id="1" name="">
+          <a:extLst>
+            <a:ext uri="{FF2B5EF4-FFF2-40B4-BE49-F238E27FC236}">
+              <a16:creationId xmlns:a16="http://schemas.microsoft.com/office/drawing/2014/main" id="{FDA1F741-DBB6-67C7-2DAF-D2F48FFE9181}"/>
+            </a:ext>
+          </a:extLst>
+        </p:cNvPr>
+        <p:cNvGrpSpPr/>
+        <p:nvPr/>
+      </p:nvGrpSpPr>
+      <p:grpSpPr>
+        <a:xfrm>
+          <a:off x="0" y="0"/>
+          <a:ext cx="0" cy="0"/>
+          <a:chOff x="0" y="0"/>
+          <a:chExt cx="0" cy="0"/>
+        </a:xfrm>
+      </p:grpSpPr>
+      <p:pic>
+        <p:nvPicPr>
+          <p:cNvPr id="3" name="Picture 2" descr="A white background with black text&#10;&#10;Description automatically generated">
+            <a:extLst>
+              <a:ext uri="{FF2B5EF4-FFF2-40B4-BE49-F238E27FC236}">
+                <a16:creationId xmlns:a16="http://schemas.microsoft.com/office/drawing/2014/main" id="{E1AFB45C-EEB8-EFE8-322B-FEA5D65E793E}"/>
+              </a:ext>
+            </a:extLst>
+          </p:cNvPr>
+          <p:cNvPicPr>
+            <a:picLocks noChangeAspect="1"/>
+          </p:cNvPicPr>
+          <p:nvPr/>
+        </p:nvPicPr>
+        <p:blipFill rotWithShape="1">
+          <a:blip r:embed="rId2">
+            <a:extLst>
+              <a:ext uri="{28A0092B-C50C-407E-A947-70E740481C1C}">
+                <a14:useLocalDpi xmlns:a14="http://schemas.microsoft.com/office/drawing/2010/main" val="0"/>
+              </a:ext>
+            </a:extLst>
+          </a:blip>
+          <a:srcRect l="44049" t="33600" r="-2343" b="-30190"/>
+          <a:stretch/>
+        </p:blipFill>
+        <p:spPr>
+          <a:xfrm>
+            <a:off x="3049730" y="0"/>
+            <a:ext cx="9708143" cy="8499226"/>
+          </a:xfrm>
+          <a:prstGeom prst="rect">
+            <a:avLst/>
+          </a:prstGeom>
+          <a:effectLst>
+            <a:softEdge rad="177800"/>
+          </a:effectLst>
+        </p:spPr>
+      </p:pic>
+      <p:sp>
+        <p:nvSpPr>
+          <p:cNvPr id="2" name="Text Placeholder 3">
+            <a:extLst>
+              <a:ext uri="{FF2B5EF4-FFF2-40B4-BE49-F238E27FC236}">
+                <a16:creationId xmlns:a16="http://schemas.microsoft.com/office/drawing/2014/main" id="{7FE01F00-167A-91D2-3753-5C4DC6402C5E}"/>
+              </a:ext>
+            </a:extLst>
+          </p:cNvPr>
+          <p:cNvSpPr txBox="1">
+            <a:spLocks/>
+          </p:cNvSpPr>
+          <p:nvPr/>
+        </p:nvSpPr>
+        <p:spPr>
+          <a:xfrm>
+            <a:off x="606552" y="1280160"/>
+            <a:ext cx="2443178" cy="4846320"/>
+          </a:xfrm>
+          <a:prstGeom prst="rect">
+            <a:avLst/>
+          </a:prstGeom>
+        </p:spPr>
+        <p:txBody>
+          <a:bodyPr/>
+          <a:lstStyle>
+            <a:lvl1pPr marL="0" indent="0" algn="l" defTabSz="914400" rtl="0" eaLnBrk="1" latinLnBrk="0" hangingPunct="1">
+              <a:lnSpc>
+                <a:spcPct val="100000"/>
+              </a:lnSpc>
+              <a:spcBef>
+                <a:spcPts val="1000"/>
+              </a:spcBef>
+              <a:buFont typeface="Arial" panose="020B0604020202020204" pitchFamily="34" charset="0"/>
+              <a:buNone/>
+              <a:defRPr sz="2400" kern="1200">
+                <a:solidFill>
+                  <a:schemeClr val="tx1"/>
+                </a:solidFill>
+                <a:latin typeface="+mn-lt"/>
+                <a:ea typeface="+mn-ea"/>
+                <a:cs typeface="+mn-cs"/>
+              </a:defRPr>
+            </a:lvl1pPr>
+            <a:lvl2pPr marL="685800" indent="-228600" algn="l" defTabSz="914400" rtl="0" eaLnBrk="1" latinLnBrk="0" hangingPunct="1">
+              <a:lnSpc>
+                <a:spcPct val="100000"/>
+              </a:lnSpc>
+              <a:spcBef>
+                <a:spcPts val="500"/>
+              </a:spcBef>
+              <a:buFont typeface="Arial" panose="020B0604020202020204" pitchFamily="34" charset="0"/>
+              <a:buChar char="•"/>
+              <a:defRPr sz="2000" kern="1200">
+                <a:solidFill>
+                  <a:schemeClr val="tx1"/>
+                </a:solidFill>
+                <a:latin typeface="+mn-lt"/>
+                <a:ea typeface="+mn-ea"/>
+                <a:cs typeface="+mn-cs"/>
+              </a:defRPr>
+            </a:lvl2pPr>
+            <a:lvl3pPr marL="914400" indent="0" algn="l" defTabSz="914400" rtl="0" eaLnBrk="1" latinLnBrk="0" hangingPunct="1">
+              <a:lnSpc>
+                <a:spcPct val="100000"/>
+              </a:lnSpc>
+              <a:spcBef>
+                <a:spcPts val="500"/>
+              </a:spcBef>
+              <a:buFont typeface="Arial" panose="020B0604020202020204" pitchFamily="34" charset="0"/>
+              <a:buNone/>
+              <a:defRPr sz="2000" kern="1200">
+                <a:solidFill>
+                  <a:schemeClr val="tx1"/>
+                </a:solidFill>
+                <a:latin typeface="+mn-lt"/>
+                <a:ea typeface="+mn-ea"/>
+                <a:cs typeface="+mn-cs"/>
+              </a:defRPr>
+            </a:lvl3pPr>
+            <a:lvl4pPr marL="1600200" indent="-228600" algn="l" defTabSz="914400" rtl="0" eaLnBrk="1" latinLnBrk="0" hangingPunct="1">
+              <a:lnSpc>
+                <a:spcPct val="100000"/>
+              </a:lnSpc>
+              <a:spcBef>
+                <a:spcPts val="500"/>
+              </a:spcBef>
+              <a:buFont typeface="Arial" panose="020B0604020202020204" pitchFamily="34" charset="0"/>
+              <a:buChar char="•"/>
+              <a:defRPr sz="1800" kern="1200">
+                <a:solidFill>
+                  <a:schemeClr val="tx1"/>
+                </a:solidFill>
+                <a:latin typeface="+mn-lt"/>
+                <a:ea typeface="+mn-ea"/>
+                <a:cs typeface="+mn-cs"/>
+              </a:defRPr>
+            </a:lvl4pPr>
+            <a:lvl5pPr marL="1828800" indent="0" algn="l" defTabSz="914400" rtl="0" eaLnBrk="1" latinLnBrk="0" hangingPunct="1">
+              <a:lnSpc>
+                <a:spcPct val="100000"/>
+              </a:lnSpc>
+              <a:spcBef>
+                <a:spcPts val="500"/>
+              </a:spcBef>
+              <a:buFont typeface="Arial" panose="020B0604020202020204" pitchFamily="34" charset="0"/>
+              <a:buNone/>
+              <a:defRPr sz="1800" kern="1200">
+                <a:solidFill>
+                  <a:schemeClr val="tx1"/>
+                </a:solidFill>
+                <a:latin typeface="+mn-lt"/>
+                <a:ea typeface="+mn-ea"/>
+                <a:cs typeface="+mn-cs"/>
+              </a:defRPr>
+            </a:lvl5pPr>
+            <a:lvl6pPr marL="2514600" indent="-228600" algn="l" defTabSz="914400" rtl="0" eaLnBrk="1" latinLnBrk="0" hangingPunct="1">
+              <a:lnSpc>
+                <a:spcPct val="90000"/>
+              </a:lnSpc>
+              <a:spcBef>
+                <a:spcPts val="500"/>
+              </a:spcBef>
+              <a:buFont typeface="Arial" panose="020B0604020202020204" pitchFamily="34" charset="0"/>
+              <a:buChar char="•"/>
+              <a:defRPr sz="1800" kern="1200">
+                <a:solidFill>
+                  <a:schemeClr val="tx1"/>
+                </a:solidFill>
+                <a:latin typeface="+mn-lt"/>
+                <a:ea typeface="+mn-ea"/>
+                <a:cs typeface="+mn-cs"/>
+              </a:defRPr>
+            </a:lvl6pPr>
+            <a:lvl7pPr marL="2971800" indent="-228600" algn="l" defTabSz="914400" rtl="0" eaLnBrk="1" latinLnBrk="0" hangingPunct="1">
+              <a:lnSpc>
+                <a:spcPct val="90000"/>
+              </a:lnSpc>
+              <a:spcBef>
+                <a:spcPts val="500"/>
+              </a:spcBef>
+              <a:buFont typeface="Arial" panose="020B0604020202020204" pitchFamily="34" charset="0"/>
+              <a:buChar char="•"/>
+              <a:defRPr sz="1800" kern="1200">
+                <a:solidFill>
+                  <a:schemeClr val="tx1"/>
+                </a:solidFill>
+                <a:latin typeface="+mn-lt"/>
+                <a:ea typeface="+mn-ea"/>
+                <a:cs typeface="+mn-cs"/>
+              </a:defRPr>
+            </a:lvl7pPr>
+            <a:lvl8pPr marL="3429000" indent="-228600" algn="l" defTabSz="914400" rtl="0" eaLnBrk="1" latinLnBrk="0" hangingPunct="1">
+              <a:lnSpc>
+                <a:spcPct val="90000"/>
+              </a:lnSpc>
+              <a:spcBef>
+                <a:spcPts val="500"/>
+              </a:spcBef>
+              <a:buFont typeface="Arial" panose="020B0604020202020204" pitchFamily="34" charset="0"/>
+              <a:buChar char="•"/>
+              <a:defRPr sz="1800" kern="1200">
+                <a:solidFill>
+                  <a:schemeClr val="tx1"/>
+                </a:solidFill>
+                <a:latin typeface="+mn-lt"/>
+                <a:ea typeface="+mn-ea"/>
+                <a:cs typeface="+mn-cs"/>
+              </a:defRPr>
+            </a:lvl8pPr>
+            <a:lvl9pPr marL="3886200" indent="-228600" algn="l" defTabSz="914400" rtl="0" eaLnBrk="1" latinLnBrk="0" hangingPunct="1">
+              <a:lnSpc>
+                <a:spcPct val="90000"/>
+              </a:lnSpc>
+              <a:spcBef>
+                <a:spcPts val="500"/>
+              </a:spcBef>
+              <a:buFont typeface="Arial" panose="020B0604020202020204" pitchFamily="34" charset="0"/>
+              <a:buChar char="•"/>
+              <a:defRPr sz="1800" kern="1200">
+                <a:solidFill>
+                  <a:schemeClr val="tx1"/>
+                </a:solidFill>
+                <a:latin typeface="+mn-lt"/>
+                <a:ea typeface="+mn-ea"/>
+                <a:cs typeface="+mn-cs"/>
+              </a:defRPr>
+            </a:lvl9pPr>
+          </a:lstStyle>
+          <a:p>
+            <a:r>
+              <a:rPr lang="en-US" dirty="0" err="1"/>
+              <a:t>TaskList</a:t>
+            </a:r>
+            <a:endParaRPr lang="en-US" dirty="0"/>
+          </a:p>
+          <a:p>
+            <a:pPr marL="342900" indent="-342900">
+              <a:buFont typeface="Arial" panose="020B0604020202020204" pitchFamily="34" charset="0"/>
+              <a:buChar char="•"/>
+            </a:pPr>
+            <a:r>
+              <a:rPr lang="en-US" dirty="0" err="1"/>
+              <a:t>taskList</a:t>
+            </a:r>
+            <a:endParaRPr lang="en-US" dirty="0"/>
+          </a:p>
+          <a:p>
+            <a:pPr marL="342900" indent="-342900">
+              <a:buFont typeface="Arial" panose="020B0604020202020204" pitchFamily="34" charset="0"/>
+              <a:buChar char="•"/>
+            </a:pPr>
+            <a:r>
+              <a:rPr lang="en-US" dirty="0"/>
+              <a:t>Task</a:t>
+            </a:r>
+          </a:p>
+          <a:p>
+            <a:pPr marL="342900" indent="-342900">
+              <a:buFont typeface="Arial" panose="020B0604020202020204" pitchFamily="34" charset="0"/>
+              <a:buChar char="•"/>
+            </a:pPr>
+            <a:r>
+              <a:rPr lang="en-US" dirty="0" err="1"/>
+              <a:t>SubTask</a:t>
+            </a:r>
+            <a:endParaRPr lang="en-US" dirty="0"/>
+          </a:p>
+          <a:p>
+            <a:pPr marL="342900" indent="-342900">
+              <a:buFont typeface="Arial" panose="020B0604020202020204" pitchFamily="34" charset="0"/>
+              <a:buChar char="•"/>
+            </a:pPr>
+            <a:r>
+              <a:rPr lang="en-US" dirty="0"/>
+              <a:t>Automatic ordering</a:t>
+            </a:r>
+          </a:p>
+        </p:txBody>
+      </p:sp>
+      <p:sp>
+        <p:nvSpPr>
+          <p:cNvPr id="4" name="Title 1">
+            <a:extLst>
+              <a:ext uri="{FF2B5EF4-FFF2-40B4-BE49-F238E27FC236}">
+                <a16:creationId xmlns:a16="http://schemas.microsoft.com/office/drawing/2014/main" id="{5512A021-0025-7751-38A1-DDF13E612D69}"/>
+              </a:ext>
+            </a:extLst>
+          </p:cNvPr>
+          <p:cNvSpPr txBox="1">
+            <a:spLocks/>
+          </p:cNvSpPr>
+          <p:nvPr/>
+        </p:nvSpPr>
+        <p:spPr>
+          <a:xfrm>
+            <a:off x="515112" y="480567"/>
+            <a:ext cx="4287393" cy="2450593"/>
+          </a:xfrm>
+          <a:prstGeom prst="rect">
+            <a:avLst/>
+          </a:prstGeom>
+        </p:spPr>
+        <p:txBody>
+          <a:bodyPr/>
+          <a:lstStyle>
+            <a:lvl1pPr algn="l" defTabSz="914400" rtl="0" eaLnBrk="1" latinLnBrk="0" hangingPunct="1">
+              <a:lnSpc>
+                <a:spcPct val="100000"/>
+              </a:lnSpc>
+              <a:spcBef>
+                <a:spcPct val="0"/>
+              </a:spcBef>
+              <a:buNone/>
+              <a:defRPr sz="6600" kern="1200">
+                <a:solidFill>
+                  <a:schemeClr val="tx1"/>
+                </a:solidFill>
+                <a:latin typeface="+mj-lt"/>
+                <a:ea typeface="+mj-ea"/>
+                <a:cs typeface="+mj-cs"/>
+              </a:defRPr>
+            </a:lvl1pPr>
+          </a:lstStyle>
+          <a:p>
+            <a:r>
+              <a:rPr lang="en-US" sz="3000" dirty="0"/>
+              <a:t>Component Diagram</a:t>
+            </a:r>
+          </a:p>
+        </p:txBody>
+      </p:sp>
+    </p:spTree>
+    <p:extLst>
+      <p:ext uri="{BB962C8B-B14F-4D97-AF65-F5344CB8AC3E}">
+        <p14:creationId xmlns:p14="http://schemas.microsoft.com/office/powerpoint/2010/main" val="3266450277"/>
+      </p:ext>
+    </p:extLst>
+  </p:cSld>
+  <p:clrMapOvr>
+    <a:masterClrMapping/>
+  </p:clrMapOvr>
+</p:sld>
+</file>
+
+<file path=ppt/slides/slide11.xml><?xml version="1.0" encoding="utf-8"?>
+<p:sld xmlns:a="http://schemas.openxmlformats.org/drawingml/2006/main" xmlns:r="http://schemas.openxmlformats.org/officeDocument/2006/relationships" xmlns:p="http://schemas.openxmlformats.org/presentationml/2006/main">
+  <p:cSld>
+    <p:spTree>
+      <p:nvGrpSpPr>
+        <p:cNvPr id="1" name="">
+          <a:extLst>
+            <a:ext uri="{FF2B5EF4-FFF2-40B4-BE49-F238E27FC236}">
+              <a16:creationId xmlns:a16="http://schemas.microsoft.com/office/drawing/2014/main" id="{E8E13915-A0B4-CCD3-1518-DEC7E3622625}"/>
+            </a:ext>
+          </a:extLst>
+        </p:cNvPr>
+        <p:cNvGrpSpPr/>
+        <p:nvPr/>
+      </p:nvGrpSpPr>
+      <p:grpSpPr>
+        <a:xfrm>
+          <a:off x="0" y="0"/>
+          <a:ext cx="0" cy="0"/>
+          <a:chOff x="0" y="0"/>
+          <a:chExt cx="0" cy="0"/>
+        </a:xfrm>
+      </p:grpSpPr>
+      <p:pic>
+        <p:nvPicPr>
+          <p:cNvPr id="3" name="Picture 2" descr="A white background with black text&#10;&#10;Description automatically generated">
+            <a:extLst>
+              <a:ext uri="{FF2B5EF4-FFF2-40B4-BE49-F238E27FC236}">
+                <a16:creationId xmlns:a16="http://schemas.microsoft.com/office/drawing/2014/main" id="{FE0858D8-8202-F540-9841-EE4C1245E90C}"/>
+              </a:ext>
+            </a:extLst>
+          </p:cNvPr>
+          <p:cNvPicPr>
+            <a:picLocks noChangeAspect="1"/>
+          </p:cNvPicPr>
+          <p:nvPr/>
+        </p:nvPicPr>
+        <p:blipFill rotWithShape="1">
+          <a:blip r:embed="rId2">
+            <a:extLst>
+              <a:ext uri="{28A0092B-C50C-407E-A947-70E740481C1C}">
+                <a14:useLocalDpi xmlns:a14="http://schemas.microsoft.com/office/drawing/2010/main" val="0"/>
+              </a:ext>
+            </a:extLst>
+          </a:blip>
+          <a:srcRect l="937" t="74553" r="39856" b="-23167"/>
+          <a:stretch/>
+        </p:blipFill>
+        <p:spPr>
+          <a:xfrm>
+            <a:off x="606552" y="4238560"/>
+            <a:ext cx="9860280" cy="4277746"/>
+          </a:xfrm>
+          <a:prstGeom prst="rect">
+            <a:avLst/>
+          </a:prstGeom>
+          <a:effectLst>
+            <a:softEdge rad="177800"/>
+          </a:effectLst>
+        </p:spPr>
+      </p:pic>
+      <p:sp>
+        <p:nvSpPr>
+          <p:cNvPr id="2" name="Text Placeholder 3">
+            <a:extLst>
+              <a:ext uri="{FF2B5EF4-FFF2-40B4-BE49-F238E27FC236}">
+                <a16:creationId xmlns:a16="http://schemas.microsoft.com/office/drawing/2014/main" id="{600A5869-19A6-C031-7F1D-7707926B8CCF}"/>
+              </a:ext>
+            </a:extLst>
+          </p:cNvPr>
+          <p:cNvSpPr txBox="1">
+            <a:spLocks/>
+          </p:cNvSpPr>
+          <p:nvPr/>
+        </p:nvSpPr>
+        <p:spPr>
+          <a:xfrm>
+            <a:off x="606552" y="1280160"/>
+            <a:ext cx="2443178" cy="4846320"/>
+          </a:xfrm>
+          <a:prstGeom prst="rect">
+            <a:avLst/>
+          </a:prstGeom>
+        </p:spPr>
+        <p:txBody>
+          <a:bodyPr/>
+          <a:lstStyle>
+            <a:lvl1pPr marL="0" indent="0" algn="l" defTabSz="914400" rtl="0" eaLnBrk="1" latinLnBrk="0" hangingPunct="1">
+              <a:lnSpc>
+                <a:spcPct val="100000"/>
+              </a:lnSpc>
+              <a:spcBef>
+                <a:spcPts val="1000"/>
+              </a:spcBef>
+              <a:buFont typeface="Arial" panose="020B0604020202020204" pitchFamily="34" charset="0"/>
+              <a:buNone/>
+              <a:defRPr sz="2400" kern="1200">
+                <a:solidFill>
+                  <a:schemeClr val="tx1"/>
+                </a:solidFill>
+                <a:latin typeface="+mn-lt"/>
+                <a:ea typeface="+mn-ea"/>
+                <a:cs typeface="+mn-cs"/>
+              </a:defRPr>
+            </a:lvl1pPr>
+            <a:lvl2pPr marL="685800" indent="-228600" algn="l" defTabSz="914400" rtl="0" eaLnBrk="1" latinLnBrk="0" hangingPunct="1">
+              <a:lnSpc>
+                <a:spcPct val="100000"/>
+              </a:lnSpc>
+              <a:spcBef>
+                <a:spcPts val="500"/>
+              </a:spcBef>
+              <a:buFont typeface="Arial" panose="020B0604020202020204" pitchFamily="34" charset="0"/>
+              <a:buChar char="•"/>
+              <a:defRPr sz="2000" kern="1200">
+                <a:solidFill>
+                  <a:schemeClr val="tx1"/>
+                </a:solidFill>
+                <a:latin typeface="+mn-lt"/>
+                <a:ea typeface="+mn-ea"/>
+                <a:cs typeface="+mn-cs"/>
+              </a:defRPr>
+            </a:lvl2pPr>
+            <a:lvl3pPr marL="914400" indent="0" algn="l" defTabSz="914400" rtl="0" eaLnBrk="1" latinLnBrk="0" hangingPunct="1">
+              <a:lnSpc>
+                <a:spcPct val="100000"/>
+              </a:lnSpc>
+              <a:spcBef>
+                <a:spcPts val="500"/>
+              </a:spcBef>
+              <a:buFont typeface="Arial" panose="020B0604020202020204" pitchFamily="34" charset="0"/>
+              <a:buNone/>
+              <a:defRPr sz="2000" kern="1200">
+                <a:solidFill>
+                  <a:schemeClr val="tx1"/>
+                </a:solidFill>
+                <a:latin typeface="+mn-lt"/>
+                <a:ea typeface="+mn-ea"/>
+                <a:cs typeface="+mn-cs"/>
+              </a:defRPr>
+            </a:lvl3pPr>
+            <a:lvl4pPr marL="1600200" indent="-228600" algn="l" defTabSz="914400" rtl="0" eaLnBrk="1" latinLnBrk="0" hangingPunct="1">
+              <a:lnSpc>
+                <a:spcPct val="100000"/>
+              </a:lnSpc>
+              <a:spcBef>
+                <a:spcPts val="500"/>
+              </a:spcBef>
+              <a:buFont typeface="Arial" panose="020B0604020202020204" pitchFamily="34" charset="0"/>
+              <a:buChar char="•"/>
+              <a:defRPr sz="1800" kern="1200">
+                <a:solidFill>
+                  <a:schemeClr val="tx1"/>
+                </a:solidFill>
+                <a:latin typeface="+mn-lt"/>
+                <a:ea typeface="+mn-ea"/>
+                <a:cs typeface="+mn-cs"/>
+              </a:defRPr>
+            </a:lvl4pPr>
+            <a:lvl5pPr marL="1828800" indent="0" algn="l" defTabSz="914400" rtl="0" eaLnBrk="1" latinLnBrk="0" hangingPunct="1">
+              <a:lnSpc>
+                <a:spcPct val="100000"/>
+              </a:lnSpc>
+              <a:spcBef>
+                <a:spcPts val="500"/>
+              </a:spcBef>
+              <a:buFont typeface="Arial" panose="020B0604020202020204" pitchFamily="34" charset="0"/>
+              <a:buNone/>
+              <a:defRPr sz="1800" kern="1200">
+                <a:solidFill>
+                  <a:schemeClr val="tx1"/>
+                </a:solidFill>
+                <a:latin typeface="+mn-lt"/>
+                <a:ea typeface="+mn-ea"/>
+                <a:cs typeface="+mn-cs"/>
+              </a:defRPr>
+            </a:lvl5pPr>
+            <a:lvl6pPr marL="2514600" indent="-228600" algn="l" defTabSz="914400" rtl="0" eaLnBrk="1" latinLnBrk="0" hangingPunct="1">
+              <a:lnSpc>
+                <a:spcPct val="90000"/>
+              </a:lnSpc>
+              <a:spcBef>
+                <a:spcPts val="500"/>
+              </a:spcBef>
+              <a:buFont typeface="Arial" panose="020B0604020202020204" pitchFamily="34" charset="0"/>
+              <a:buChar char="•"/>
+              <a:defRPr sz="1800" kern="1200">
+                <a:solidFill>
+                  <a:schemeClr val="tx1"/>
+                </a:solidFill>
+                <a:latin typeface="+mn-lt"/>
+                <a:ea typeface="+mn-ea"/>
+                <a:cs typeface="+mn-cs"/>
+              </a:defRPr>
+            </a:lvl6pPr>
+            <a:lvl7pPr marL="2971800" indent="-228600" algn="l" defTabSz="914400" rtl="0" eaLnBrk="1" latinLnBrk="0" hangingPunct="1">
+              <a:lnSpc>
+                <a:spcPct val="90000"/>
+              </a:lnSpc>
+              <a:spcBef>
+                <a:spcPts val="500"/>
+              </a:spcBef>
+              <a:buFont typeface="Arial" panose="020B0604020202020204" pitchFamily="34" charset="0"/>
+              <a:buChar char="•"/>
+              <a:defRPr sz="1800" kern="1200">
+                <a:solidFill>
+                  <a:schemeClr val="tx1"/>
+                </a:solidFill>
+                <a:latin typeface="+mn-lt"/>
+                <a:ea typeface="+mn-ea"/>
+                <a:cs typeface="+mn-cs"/>
+              </a:defRPr>
+            </a:lvl7pPr>
+            <a:lvl8pPr marL="3429000" indent="-228600" algn="l" defTabSz="914400" rtl="0" eaLnBrk="1" latinLnBrk="0" hangingPunct="1">
+              <a:lnSpc>
+                <a:spcPct val="90000"/>
+              </a:lnSpc>
+              <a:spcBef>
+                <a:spcPts val="500"/>
+              </a:spcBef>
+              <a:buFont typeface="Arial" panose="020B0604020202020204" pitchFamily="34" charset="0"/>
+              <a:buChar char="•"/>
+              <a:defRPr sz="1800" kern="1200">
+                <a:solidFill>
+                  <a:schemeClr val="tx1"/>
+                </a:solidFill>
+                <a:latin typeface="+mn-lt"/>
+                <a:ea typeface="+mn-ea"/>
+                <a:cs typeface="+mn-cs"/>
+              </a:defRPr>
+            </a:lvl8pPr>
+            <a:lvl9pPr marL="3886200" indent="-228600" algn="l" defTabSz="914400" rtl="0" eaLnBrk="1" latinLnBrk="0" hangingPunct="1">
+              <a:lnSpc>
+                <a:spcPct val="90000"/>
+              </a:lnSpc>
+              <a:spcBef>
+                <a:spcPts val="500"/>
+              </a:spcBef>
+              <a:buFont typeface="Arial" panose="020B0604020202020204" pitchFamily="34" charset="0"/>
+              <a:buChar char="•"/>
+              <a:defRPr sz="1800" kern="1200">
+                <a:solidFill>
+                  <a:schemeClr val="tx1"/>
+                </a:solidFill>
+                <a:latin typeface="+mn-lt"/>
+                <a:ea typeface="+mn-ea"/>
+                <a:cs typeface="+mn-cs"/>
+              </a:defRPr>
+            </a:lvl9pPr>
+          </a:lstStyle>
+          <a:p>
+            <a:r>
+              <a:rPr lang="en-US" dirty="0" err="1"/>
+              <a:t>TaskList</a:t>
+            </a:r>
+            <a:endParaRPr lang="en-US" dirty="0"/>
+          </a:p>
+          <a:p>
+            <a:pPr marL="342900" indent="-342900">
+              <a:buFont typeface="Arial" panose="020B0604020202020204" pitchFamily="34" charset="0"/>
+              <a:buChar char="•"/>
+            </a:pPr>
+            <a:r>
+              <a:rPr lang="en-US" dirty="0" err="1"/>
+              <a:t>taskList</a:t>
+            </a:r>
+            <a:endParaRPr lang="en-US" dirty="0"/>
+          </a:p>
+          <a:p>
+            <a:pPr marL="342900" indent="-342900">
+              <a:buFont typeface="Arial" panose="020B0604020202020204" pitchFamily="34" charset="0"/>
+              <a:buChar char="•"/>
+            </a:pPr>
+            <a:r>
+              <a:rPr lang="en-US" dirty="0"/>
+              <a:t>Task</a:t>
+            </a:r>
+          </a:p>
+          <a:p>
+            <a:pPr marL="342900" indent="-342900">
+              <a:buFont typeface="Arial" panose="020B0604020202020204" pitchFamily="34" charset="0"/>
+              <a:buChar char="•"/>
+            </a:pPr>
+            <a:r>
+              <a:rPr lang="en-US" dirty="0" err="1"/>
+              <a:t>SubTask</a:t>
+            </a:r>
+            <a:endParaRPr lang="en-US" dirty="0"/>
+          </a:p>
+          <a:p>
+            <a:pPr marL="342900" indent="-342900">
+              <a:buFont typeface="Arial" panose="020B0604020202020204" pitchFamily="34" charset="0"/>
+              <a:buChar char="•"/>
+            </a:pPr>
+            <a:r>
+              <a:rPr lang="en-US" dirty="0"/>
+              <a:t>Automatic ordering</a:t>
+            </a:r>
+          </a:p>
+        </p:txBody>
+      </p:sp>
+      <p:sp>
+        <p:nvSpPr>
+          <p:cNvPr id="4" name="Title 1">
+            <a:extLst>
+              <a:ext uri="{FF2B5EF4-FFF2-40B4-BE49-F238E27FC236}">
+                <a16:creationId xmlns:a16="http://schemas.microsoft.com/office/drawing/2014/main" id="{2DD77A84-BE98-92D0-4CD0-4683591F3007}"/>
+              </a:ext>
+            </a:extLst>
+          </p:cNvPr>
+          <p:cNvSpPr txBox="1">
+            <a:spLocks/>
+          </p:cNvSpPr>
+          <p:nvPr/>
+        </p:nvSpPr>
+        <p:spPr>
+          <a:xfrm>
+            <a:off x="515112" y="480567"/>
+            <a:ext cx="4287393" cy="2450593"/>
+          </a:xfrm>
+          <a:prstGeom prst="rect">
+            <a:avLst/>
+          </a:prstGeom>
+        </p:spPr>
+        <p:txBody>
+          <a:bodyPr/>
+          <a:lstStyle>
+            <a:lvl1pPr algn="l" defTabSz="914400" rtl="0" eaLnBrk="1" latinLnBrk="0" hangingPunct="1">
+              <a:lnSpc>
+                <a:spcPct val="100000"/>
+              </a:lnSpc>
+              <a:spcBef>
+                <a:spcPct val="0"/>
+              </a:spcBef>
+              <a:buNone/>
+              <a:defRPr sz="6600" kern="1200">
+                <a:solidFill>
+                  <a:schemeClr val="tx1"/>
+                </a:solidFill>
+                <a:latin typeface="+mj-lt"/>
+                <a:ea typeface="+mj-ea"/>
+                <a:cs typeface="+mj-cs"/>
+              </a:defRPr>
+            </a:lvl1pPr>
+          </a:lstStyle>
+          <a:p>
+            <a:r>
+              <a:rPr lang="en-US" sz="3000" dirty="0"/>
+              <a:t>Component Diagram</a:t>
+            </a:r>
+          </a:p>
+        </p:txBody>
+      </p:sp>
+    </p:spTree>
+    <p:extLst>
+      <p:ext uri="{BB962C8B-B14F-4D97-AF65-F5344CB8AC3E}">
+        <p14:creationId xmlns:p14="http://schemas.microsoft.com/office/powerpoint/2010/main" val="2351279164"/>
+      </p:ext>
+    </p:extLst>
+  </p:cSld>
+  <p:clrMapOvr>
+    <a:masterClrMapping/>
+  </p:clrMapOvr>
+</p:sld>
+</file>
+
+<file path=ppt/slides/slide12.xml><?xml version="1.0" encoding="utf-8"?>
+<p:sld xmlns:a="http://schemas.openxmlformats.org/drawingml/2006/main" xmlns:r="http://schemas.openxmlformats.org/officeDocument/2006/relationships" xmlns:p="http://schemas.openxmlformats.org/presentationml/2006/main">
+  <p:cSld>
+    <p:spTree>
+      <p:nvGrpSpPr>
+        <p:cNvPr id="1" name=""/>
+        <p:cNvGrpSpPr/>
+        <p:nvPr/>
+      </p:nvGrpSpPr>
+      <p:grpSpPr>
+        <a:xfrm>
+          <a:off x="0" y="0"/>
+          <a:ext cx="0" cy="0"/>
+          <a:chOff x="0" y="0"/>
+          <a:chExt cx="0" cy="0"/>
+        </a:xfrm>
+      </p:grpSpPr>
+      <p:sp>
+        <p:nvSpPr>
+          <p:cNvPr id="2" name="Title 1">
+            <a:extLst>
+              <a:ext uri="{FF2B5EF4-FFF2-40B4-BE49-F238E27FC236}">
+                <a16:creationId xmlns:a16="http://schemas.microsoft.com/office/drawing/2014/main" id="{EBD08629-E096-1DDD-DA0D-AD00D8CF4E8A}"/>
+              </a:ext>
+            </a:extLst>
+          </p:cNvPr>
+          <p:cNvSpPr>
+            <a:spLocks noGrp="1"/>
+          </p:cNvSpPr>
+          <p:nvPr>
+            <p:ph type="title"/>
+          </p:nvPr>
+        </p:nvSpPr>
+        <p:spPr/>
+        <p:txBody>
+          <a:bodyPr/>
+          <a:lstStyle/>
+          <a:p>
+            <a:r>
+              <a:rPr lang="en-US" dirty="0" err="1"/>
+              <a:t>afdf</a:t>
+            </a:r>
+            <a:endParaRPr lang="en-US" dirty="0"/>
+          </a:p>
+        </p:txBody>
+      </p:sp>
+      <p:sp>
+        <p:nvSpPr>
+          <p:cNvPr id="3" name="Picture Placeholder 2">
+            <a:extLst>
+              <a:ext uri="{FF2B5EF4-FFF2-40B4-BE49-F238E27FC236}">
+                <a16:creationId xmlns:a16="http://schemas.microsoft.com/office/drawing/2014/main" id="{BF8634C1-36AC-D8ED-0F52-30014871D905}"/>
+              </a:ext>
+            </a:extLst>
+          </p:cNvPr>
+          <p:cNvSpPr>
+            <a:spLocks noGrp="1"/>
+          </p:cNvSpPr>
+          <p:nvPr>
+            <p:ph type="pic" idx="1"/>
+          </p:nvPr>
+        </p:nvSpPr>
+        <p:spPr/>
+        <p:txBody>
+          <a:bodyPr/>
+          <a:lstStyle/>
+          <a:p>
+            <a:endParaRPr lang="en-US"/>
+          </a:p>
+        </p:txBody>
+      </p:sp>
+      <p:sp>
+        <p:nvSpPr>
+          <p:cNvPr id="4" name="Text Placeholder 3">
+            <a:extLst>
+              <a:ext uri="{FF2B5EF4-FFF2-40B4-BE49-F238E27FC236}">
+                <a16:creationId xmlns:a16="http://schemas.microsoft.com/office/drawing/2014/main" id="{E5F88F04-E65A-A2D1-1ED7-D13788A7E546}"/>
+              </a:ext>
+            </a:extLst>
+          </p:cNvPr>
+          <p:cNvSpPr>
+            <a:spLocks noGrp="1"/>
+          </p:cNvSpPr>
+          <p:nvPr>
+            <p:ph type="body" sz="half" idx="2"/>
+          </p:nvPr>
+        </p:nvSpPr>
+        <p:spPr/>
+        <p:txBody>
+          <a:bodyPr/>
+          <a:lstStyle/>
+          <a:p>
+            <a:r>
+              <a:rPr lang="en-US" dirty="0" err="1"/>
+              <a:t>dafdf</a:t>
+            </a:r>
+            <a:endParaRPr lang="en-US" dirty="0"/>
+          </a:p>
+        </p:txBody>
+      </p:sp>
+    </p:spTree>
+    <p:extLst>
+      <p:ext uri="{BB962C8B-B14F-4D97-AF65-F5344CB8AC3E}">
+        <p14:creationId xmlns:p14="http://schemas.microsoft.com/office/powerpoint/2010/main" val="687385264"/>
+      </p:ext>
+    </p:extLst>
+  </p:cSld>
+  <p:clrMapOvr>
+    <a:masterClrMapping/>
+  </p:clrMapOvr>
+</p:sld>
+</file>
+
+<file path=ppt/slides/slide13.xml><?xml version="1.0" encoding="utf-8"?>
+<p:sld xmlns:a="http://schemas.openxmlformats.org/drawingml/2006/main" xmlns:r="http://schemas.openxmlformats.org/officeDocument/2006/relationships" xmlns:p="http://schemas.openxmlformats.org/presentationml/2006/main">
+  <p:cSld>
+    <p:spTree>
+      <p:nvGrpSpPr>
+        <p:cNvPr id="1" name="">
+          <a:extLst>
+            <a:ext uri="{FF2B5EF4-FFF2-40B4-BE49-F238E27FC236}">
+              <a16:creationId xmlns:a16="http://schemas.microsoft.com/office/drawing/2014/main" id="{95A9A0B1-B9CC-5E69-DB3A-AF83103D5385}"/>
+            </a:ext>
+          </a:extLst>
+        </p:cNvPr>
+        <p:cNvGrpSpPr/>
+        <p:nvPr/>
+      </p:nvGrpSpPr>
+      <p:grpSpPr>
+        <a:xfrm>
+          <a:off x="0" y="0"/>
+          <a:ext cx="0" cy="0"/>
+          <a:chOff x="0" y="0"/>
+          <a:chExt cx="0" cy="0"/>
+        </a:xfrm>
+      </p:grpSpPr>
+      <p:pic>
+        <p:nvPicPr>
+          <p:cNvPr id="3" name="Picture 2" descr="A white background with black text&#10;&#10;Description automatically generated">
+            <a:extLst>
+              <a:ext uri="{FF2B5EF4-FFF2-40B4-BE49-F238E27FC236}">
+                <a16:creationId xmlns:a16="http://schemas.microsoft.com/office/drawing/2014/main" id="{7E825E69-F9D4-50DE-237F-A0D1C0AC6964}"/>
+              </a:ext>
+            </a:extLst>
+          </p:cNvPr>
+          <p:cNvPicPr>
+            <a:picLocks noChangeAspect="1"/>
+          </p:cNvPicPr>
+          <p:nvPr/>
+        </p:nvPicPr>
+        <p:blipFill>
+          <a:blip r:embed="rId2">
+            <a:extLst>
+              <a:ext uri="{28A0092B-C50C-407E-A947-70E740481C1C}">
+                <a14:useLocalDpi xmlns:a14="http://schemas.microsoft.com/office/drawing/2010/main" val="0"/>
+              </a:ext>
+            </a:extLst>
+          </a:blip>
+          <a:stretch>
+            <a:fillRect/>
+          </a:stretch>
+        </p:blipFill>
+        <p:spPr>
+          <a:xfrm>
+            <a:off x="0" y="208223"/>
+            <a:ext cx="12192000" cy="6441554"/>
+          </a:xfrm>
+          <a:prstGeom prst="rect">
+            <a:avLst/>
+          </a:prstGeom>
+        </p:spPr>
+      </p:pic>
+    </p:spTree>
+    <p:extLst>
+      <p:ext uri="{BB962C8B-B14F-4D97-AF65-F5344CB8AC3E}">
+        <p14:creationId xmlns:p14="http://schemas.microsoft.com/office/powerpoint/2010/main" val="398910363"/>
+      </p:ext>
+    </p:extLst>
+  </p:cSld>
+  <p:clrMapOvr>
+    <a:masterClrMapping/>
+  </p:clrMapOvr>
+</p:sld>
+</file>
+
 <file path=ppt/slides/slide2.xml><?xml version="1.0" encoding="utf-8"?>
 <p:sld xmlns:a="http://schemas.openxmlformats.org/drawingml/2006/main" xmlns:r="http://schemas.openxmlformats.org/officeDocument/2006/relationships" xmlns:p="http://schemas.openxmlformats.org/presentationml/2006/main">
   <p:cSld>
@@ -5919,6 +6843,581 @@
     <p:extLst>
       <p:ext uri="{BB962C8B-B14F-4D97-AF65-F5344CB8AC3E}">
         <p14:creationId xmlns:p14="http://schemas.microsoft.com/office/powerpoint/2010/main" val="532518087"/>
+      </p:ext>
+    </p:extLst>
+  </p:cSld>
+  <p:clrMapOvr>
+    <a:masterClrMapping/>
+  </p:clrMapOvr>
+</p:sld>
+</file>
+
+<file path=ppt/slides/slide7.xml><?xml version="1.0" encoding="utf-8"?>
+<p:sld xmlns:a="http://schemas.openxmlformats.org/drawingml/2006/main" xmlns:r="http://schemas.openxmlformats.org/officeDocument/2006/relationships" xmlns:p="http://schemas.openxmlformats.org/presentationml/2006/main">
+  <p:cSld>
+    <p:spTree>
+      <p:nvGrpSpPr>
+        <p:cNvPr id="1" name=""/>
+        <p:cNvGrpSpPr/>
+        <p:nvPr/>
+      </p:nvGrpSpPr>
+      <p:grpSpPr>
+        <a:xfrm>
+          <a:off x="0" y="0"/>
+          <a:ext cx="0" cy="0"/>
+          <a:chOff x="0" y="0"/>
+          <a:chExt cx="0" cy="0"/>
+        </a:xfrm>
+      </p:grpSpPr>
+      <p:sp>
+        <p:nvSpPr>
+          <p:cNvPr id="2" name="Title 1">
+            <a:extLst>
+              <a:ext uri="{FF2B5EF4-FFF2-40B4-BE49-F238E27FC236}">
+                <a16:creationId xmlns:a16="http://schemas.microsoft.com/office/drawing/2014/main" id="{D0094F6E-6DC4-9318-6247-0CB267E8DC97}"/>
+              </a:ext>
+            </a:extLst>
+          </p:cNvPr>
+          <p:cNvSpPr>
+            <a:spLocks noGrp="1"/>
+          </p:cNvSpPr>
+          <p:nvPr>
+            <p:ph type="ctrTitle"/>
+          </p:nvPr>
+        </p:nvSpPr>
+        <p:spPr/>
+        <p:txBody>
+          <a:bodyPr/>
+          <a:lstStyle/>
+          <a:p>
+            <a:r>
+              <a:rPr lang="en-US" dirty="0"/>
+              <a:t>Functionality</a:t>
+            </a:r>
+          </a:p>
+        </p:txBody>
+      </p:sp>
+      <p:sp>
+        <p:nvSpPr>
+          <p:cNvPr id="3" name="Subtitle 2">
+            <a:extLst>
+              <a:ext uri="{FF2B5EF4-FFF2-40B4-BE49-F238E27FC236}">
+                <a16:creationId xmlns:a16="http://schemas.microsoft.com/office/drawing/2014/main" id="{2AC92756-F7BF-7354-F3CD-B839C42CBBE2}"/>
+              </a:ext>
+            </a:extLst>
+          </p:cNvPr>
+          <p:cNvSpPr>
+            <a:spLocks noGrp="1"/>
+          </p:cNvSpPr>
+          <p:nvPr>
+            <p:ph type="subTitle" idx="1"/>
+          </p:nvPr>
+        </p:nvSpPr>
+        <p:spPr/>
+        <p:txBody>
+          <a:bodyPr/>
+          <a:lstStyle/>
+          <a:p>
+            <a:endParaRPr lang="en-US"/>
+          </a:p>
+        </p:txBody>
+      </p:sp>
+    </p:spTree>
+    <p:extLst>
+      <p:ext uri="{BB962C8B-B14F-4D97-AF65-F5344CB8AC3E}">
+        <p14:creationId xmlns:p14="http://schemas.microsoft.com/office/powerpoint/2010/main" val="715663043"/>
+      </p:ext>
+    </p:extLst>
+  </p:cSld>
+  <p:clrMapOvr>
+    <a:masterClrMapping/>
+  </p:clrMapOvr>
+</p:sld>
+</file>
+
+<file path=ppt/slides/slide8.xml><?xml version="1.0" encoding="utf-8"?>
+<p:sld xmlns:a="http://schemas.openxmlformats.org/drawingml/2006/main" xmlns:r="http://schemas.openxmlformats.org/officeDocument/2006/relationships" xmlns:p="http://schemas.openxmlformats.org/presentationml/2006/main">
+  <p:cSld>
+    <p:spTree>
+      <p:nvGrpSpPr>
+        <p:cNvPr id="1" name=""/>
+        <p:cNvGrpSpPr/>
+        <p:nvPr/>
+      </p:nvGrpSpPr>
+      <p:grpSpPr>
+        <a:xfrm>
+          <a:off x="0" y="0"/>
+          <a:ext cx="0" cy="0"/>
+          <a:chOff x="0" y="0"/>
+          <a:chExt cx="0" cy="0"/>
+        </a:xfrm>
+      </p:grpSpPr>
+      <p:pic>
+        <p:nvPicPr>
+          <p:cNvPr id="3" name="Picture 2" descr="A white background with black text&#10;&#10;Description automatically generated">
+            <a:extLst>
+              <a:ext uri="{FF2B5EF4-FFF2-40B4-BE49-F238E27FC236}">
+                <a16:creationId xmlns:a16="http://schemas.microsoft.com/office/drawing/2014/main" id="{3F947749-1FFF-946F-E7DC-205C95DDF7C2}"/>
+              </a:ext>
+            </a:extLst>
+          </p:cNvPr>
+          <p:cNvPicPr>
+            <a:picLocks noChangeAspect="1"/>
+          </p:cNvPicPr>
+          <p:nvPr/>
+        </p:nvPicPr>
+        <p:blipFill>
+          <a:blip r:embed="rId2">
+            <a:extLst>
+              <a:ext uri="{28A0092B-C50C-407E-A947-70E740481C1C}">
+                <a14:useLocalDpi xmlns:a14="http://schemas.microsoft.com/office/drawing/2010/main" val="0"/>
+              </a:ext>
+            </a:extLst>
+          </a:blip>
+          <a:stretch>
+            <a:fillRect/>
+          </a:stretch>
+        </p:blipFill>
+        <p:spPr>
+          <a:xfrm>
+            <a:off x="0" y="208223"/>
+            <a:ext cx="12192000" cy="6441554"/>
+          </a:xfrm>
+          <a:prstGeom prst="rect">
+            <a:avLst/>
+          </a:prstGeom>
+        </p:spPr>
+      </p:pic>
+      <p:sp>
+        <p:nvSpPr>
+          <p:cNvPr id="4" name="Title 1">
+            <a:extLst>
+              <a:ext uri="{FF2B5EF4-FFF2-40B4-BE49-F238E27FC236}">
+                <a16:creationId xmlns:a16="http://schemas.microsoft.com/office/drawing/2014/main" id="{A11AEDC7-ED5B-C753-8A09-7B012AD9F330}"/>
+              </a:ext>
+            </a:extLst>
+          </p:cNvPr>
+          <p:cNvSpPr txBox="1">
+            <a:spLocks/>
+          </p:cNvSpPr>
+          <p:nvPr/>
+        </p:nvSpPr>
+        <p:spPr>
+          <a:xfrm>
+            <a:off x="7904607" y="409447"/>
+            <a:ext cx="4287393" cy="2450593"/>
+          </a:xfrm>
+          <a:prstGeom prst="rect">
+            <a:avLst/>
+          </a:prstGeom>
+        </p:spPr>
+        <p:txBody>
+          <a:bodyPr/>
+          <a:lstStyle>
+            <a:lvl1pPr algn="l" defTabSz="914400" rtl="0" eaLnBrk="1" latinLnBrk="0" hangingPunct="1">
+              <a:lnSpc>
+                <a:spcPct val="100000"/>
+              </a:lnSpc>
+              <a:spcBef>
+                <a:spcPct val="0"/>
+              </a:spcBef>
+              <a:buNone/>
+              <a:defRPr sz="6600" kern="1200">
+                <a:solidFill>
+                  <a:schemeClr val="tx1"/>
+                </a:solidFill>
+                <a:latin typeface="+mj-lt"/>
+                <a:ea typeface="+mj-ea"/>
+                <a:cs typeface="+mj-cs"/>
+              </a:defRPr>
+            </a:lvl1pPr>
+          </a:lstStyle>
+          <a:p>
+            <a:r>
+              <a:rPr lang="en-US" sz="3000" dirty="0"/>
+              <a:t>Component Diagram</a:t>
+            </a:r>
+          </a:p>
+        </p:txBody>
+      </p:sp>
+    </p:spTree>
+    <p:extLst>
+      <p:ext uri="{BB962C8B-B14F-4D97-AF65-F5344CB8AC3E}">
+        <p14:creationId xmlns:p14="http://schemas.microsoft.com/office/powerpoint/2010/main" val="870489951"/>
+      </p:ext>
+    </p:extLst>
+  </p:cSld>
+  <p:clrMapOvr>
+    <a:masterClrMapping/>
+  </p:clrMapOvr>
+</p:sld>
+</file>
+
+<file path=ppt/slides/slide9.xml><?xml version="1.0" encoding="utf-8"?>
+<p:sld xmlns:a="http://schemas.openxmlformats.org/drawingml/2006/main" xmlns:r="http://schemas.openxmlformats.org/officeDocument/2006/relationships" xmlns:p="http://schemas.openxmlformats.org/presentationml/2006/main">
+  <p:cSld>
+    <p:spTree>
+      <p:nvGrpSpPr>
+        <p:cNvPr id="1" name="">
+          <a:extLst>
+            <a:ext uri="{FF2B5EF4-FFF2-40B4-BE49-F238E27FC236}">
+              <a16:creationId xmlns:a16="http://schemas.microsoft.com/office/drawing/2014/main" id="{96B00724-D1C3-3C94-2103-F24BD5150541}"/>
+            </a:ext>
+          </a:extLst>
+        </p:cNvPr>
+        <p:cNvGrpSpPr/>
+        <p:nvPr/>
+      </p:nvGrpSpPr>
+      <p:grpSpPr>
+        <a:xfrm>
+          <a:off x="0" y="0"/>
+          <a:ext cx="0" cy="0"/>
+          <a:chOff x="0" y="0"/>
+          <a:chExt cx="0" cy="0"/>
+        </a:xfrm>
+      </p:grpSpPr>
+      <p:pic>
+        <p:nvPicPr>
+          <p:cNvPr id="3" name="Picture 2" descr="A white background with black text&#10;&#10;Description automatically generated">
+            <a:extLst>
+              <a:ext uri="{FF2B5EF4-FFF2-40B4-BE49-F238E27FC236}">
+                <a16:creationId xmlns:a16="http://schemas.microsoft.com/office/drawing/2014/main" id="{9388CE7B-8890-E5A6-A5DB-B99986A69FCD}"/>
+              </a:ext>
+            </a:extLst>
+          </p:cNvPr>
+          <p:cNvPicPr>
+            <a:picLocks noChangeAspect="1"/>
+          </p:cNvPicPr>
+          <p:nvPr/>
+        </p:nvPicPr>
+        <p:blipFill rotWithShape="1">
+          <a:blip r:embed="rId2">
+            <a:extLst>
+              <a:ext uri="{28A0092B-C50C-407E-A947-70E740481C1C}">
+                <a14:useLocalDpi xmlns:a14="http://schemas.microsoft.com/office/drawing/2010/main" val="0"/>
+              </a:ext>
+            </a:extLst>
+          </a:blip>
+          <a:srcRect l="13635" t="-3058" r="35675" b="-16698"/>
+          <a:stretch/>
+        </p:blipFill>
+        <p:spPr>
+          <a:xfrm>
+            <a:off x="5354320" y="-1127760"/>
+            <a:ext cx="7315200" cy="9131217"/>
+          </a:xfrm>
+          <a:prstGeom prst="rect">
+            <a:avLst/>
+          </a:prstGeom>
+          <a:effectLst>
+            <a:softEdge rad="381000"/>
+          </a:effectLst>
+        </p:spPr>
+      </p:pic>
+      <p:sp>
+        <p:nvSpPr>
+          <p:cNvPr id="2" name="Text Placeholder 3">
+            <a:extLst>
+              <a:ext uri="{FF2B5EF4-FFF2-40B4-BE49-F238E27FC236}">
+                <a16:creationId xmlns:a16="http://schemas.microsoft.com/office/drawing/2014/main" id="{B68FE0D0-16C3-E124-A2FC-B275513DE36A}"/>
+              </a:ext>
+            </a:extLst>
+          </p:cNvPr>
+          <p:cNvSpPr txBox="1">
+            <a:spLocks/>
+          </p:cNvSpPr>
+          <p:nvPr/>
+        </p:nvSpPr>
+        <p:spPr>
+          <a:xfrm>
+            <a:off x="606552" y="1280160"/>
+            <a:ext cx="4287393" cy="4846320"/>
+          </a:xfrm>
+          <a:prstGeom prst="rect">
+            <a:avLst/>
+          </a:prstGeom>
+        </p:spPr>
+        <p:txBody>
+          <a:bodyPr/>
+          <a:lstStyle>
+            <a:lvl1pPr marL="0" indent="0" algn="l" defTabSz="914400" rtl="0" eaLnBrk="1" latinLnBrk="0" hangingPunct="1">
+              <a:lnSpc>
+                <a:spcPct val="100000"/>
+              </a:lnSpc>
+              <a:spcBef>
+                <a:spcPts val="1000"/>
+              </a:spcBef>
+              <a:buFont typeface="Arial" panose="020B0604020202020204" pitchFamily="34" charset="0"/>
+              <a:buNone/>
+              <a:defRPr sz="2400" kern="1200">
+                <a:solidFill>
+                  <a:schemeClr val="tx1"/>
+                </a:solidFill>
+                <a:latin typeface="+mn-lt"/>
+                <a:ea typeface="+mn-ea"/>
+                <a:cs typeface="+mn-cs"/>
+              </a:defRPr>
+            </a:lvl1pPr>
+            <a:lvl2pPr marL="685800" indent="-228600" algn="l" defTabSz="914400" rtl="0" eaLnBrk="1" latinLnBrk="0" hangingPunct="1">
+              <a:lnSpc>
+                <a:spcPct val="100000"/>
+              </a:lnSpc>
+              <a:spcBef>
+                <a:spcPts val="500"/>
+              </a:spcBef>
+              <a:buFont typeface="Arial" panose="020B0604020202020204" pitchFamily="34" charset="0"/>
+              <a:buChar char="•"/>
+              <a:defRPr sz="2000" kern="1200">
+                <a:solidFill>
+                  <a:schemeClr val="tx1"/>
+                </a:solidFill>
+                <a:latin typeface="+mn-lt"/>
+                <a:ea typeface="+mn-ea"/>
+                <a:cs typeface="+mn-cs"/>
+              </a:defRPr>
+            </a:lvl2pPr>
+            <a:lvl3pPr marL="914400" indent="0" algn="l" defTabSz="914400" rtl="0" eaLnBrk="1" latinLnBrk="0" hangingPunct="1">
+              <a:lnSpc>
+                <a:spcPct val="100000"/>
+              </a:lnSpc>
+              <a:spcBef>
+                <a:spcPts val="500"/>
+              </a:spcBef>
+              <a:buFont typeface="Arial" panose="020B0604020202020204" pitchFamily="34" charset="0"/>
+              <a:buNone/>
+              <a:defRPr sz="2000" kern="1200">
+                <a:solidFill>
+                  <a:schemeClr val="tx1"/>
+                </a:solidFill>
+                <a:latin typeface="+mn-lt"/>
+                <a:ea typeface="+mn-ea"/>
+                <a:cs typeface="+mn-cs"/>
+              </a:defRPr>
+            </a:lvl3pPr>
+            <a:lvl4pPr marL="1600200" indent="-228600" algn="l" defTabSz="914400" rtl="0" eaLnBrk="1" latinLnBrk="0" hangingPunct="1">
+              <a:lnSpc>
+                <a:spcPct val="100000"/>
+              </a:lnSpc>
+              <a:spcBef>
+                <a:spcPts val="500"/>
+              </a:spcBef>
+              <a:buFont typeface="Arial" panose="020B0604020202020204" pitchFamily="34" charset="0"/>
+              <a:buChar char="•"/>
+              <a:defRPr sz="1800" kern="1200">
+                <a:solidFill>
+                  <a:schemeClr val="tx1"/>
+                </a:solidFill>
+                <a:latin typeface="+mn-lt"/>
+                <a:ea typeface="+mn-ea"/>
+                <a:cs typeface="+mn-cs"/>
+              </a:defRPr>
+            </a:lvl4pPr>
+            <a:lvl5pPr marL="1828800" indent="0" algn="l" defTabSz="914400" rtl="0" eaLnBrk="1" latinLnBrk="0" hangingPunct="1">
+              <a:lnSpc>
+                <a:spcPct val="100000"/>
+              </a:lnSpc>
+              <a:spcBef>
+                <a:spcPts val="500"/>
+              </a:spcBef>
+              <a:buFont typeface="Arial" panose="020B0604020202020204" pitchFamily="34" charset="0"/>
+              <a:buNone/>
+              <a:defRPr sz="1800" kern="1200">
+                <a:solidFill>
+                  <a:schemeClr val="tx1"/>
+                </a:solidFill>
+                <a:latin typeface="+mn-lt"/>
+                <a:ea typeface="+mn-ea"/>
+                <a:cs typeface="+mn-cs"/>
+              </a:defRPr>
+            </a:lvl5pPr>
+            <a:lvl6pPr marL="2514600" indent="-228600" algn="l" defTabSz="914400" rtl="0" eaLnBrk="1" latinLnBrk="0" hangingPunct="1">
+              <a:lnSpc>
+                <a:spcPct val="90000"/>
+              </a:lnSpc>
+              <a:spcBef>
+                <a:spcPts val="500"/>
+              </a:spcBef>
+              <a:buFont typeface="Arial" panose="020B0604020202020204" pitchFamily="34" charset="0"/>
+              <a:buChar char="•"/>
+              <a:defRPr sz="1800" kern="1200">
+                <a:solidFill>
+                  <a:schemeClr val="tx1"/>
+                </a:solidFill>
+                <a:latin typeface="+mn-lt"/>
+                <a:ea typeface="+mn-ea"/>
+                <a:cs typeface="+mn-cs"/>
+              </a:defRPr>
+            </a:lvl6pPr>
+            <a:lvl7pPr marL="2971800" indent="-228600" algn="l" defTabSz="914400" rtl="0" eaLnBrk="1" latinLnBrk="0" hangingPunct="1">
+              <a:lnSpc>
+                <a:spcPct val="90000"/>
+              </a:lnSpc>
+              <a:spcBef>
+                <a:spcPts val="500"/>
+              </a:spcBef>
+              <a:buFont typeface="Arial" panose="020B0604020202020204" pitchFamily="34" charset="0"/>
+              <a:buChar char="•"/>
+              <a:defRPr sz="1800" kern="1200">
+                <a:solidFill>
+                  <a:schemeClr val="tx1"/>
+                </a:solidFill>
+                <a:latin typeface="+mn-lt"/>
+                <a:ea typeface="+mn-ea"/>
+                <a:cs typeface="+mn-cs"/>
+              </a:defRPr>
+            </a:lvl7pPr>
+            <a:lvl8pPr marL="3429000" indent="-228600" algn="l" defTabSz="914400" rtl="0" eaLnBrk="1" latinLnBrk="0" hangingPunct="1">
+              <a:lnSpc>
+                <a:spcPct val="90000"/>
+              </a:lnSpc>
+              <a:spcBef>
+                <a:spcPts val="500"/>
+              </a:spcBef>
+              <a:buFont typeface="Arial" panose="020B0604020202020204" pitchFamily="34" charset="0"/>
+              <a:buChar char="•"/>
+              <a:defRPr sz="1800" kern="1200">
+                <a:solidFill>
+                  <a:schemeClr val="tx1"/>
+                </a:solidFill>
+                <a:latin typeface="+mn-lt"/>
+                <a:ea typeface="+mn-ea"/>
+                <a:cs typeface="+mn-cs"/>
+              </a:defRPr>
+            </a:lvl8pPr>
+            <a:lvl9pPr marL="3886200" indent="-228600" algn="l" defTabSz="914400" rtl="0" eaLnBrk="1" latinLnBrk="0" hangingPunct="1">
+              <a:lnSpc>
+                <a:spcPct val="90000"/>
+              </a:lnSpc>
+              <a:spcBef>
+                <a:spcPts val="500"/>
+              </a:spcBef>
+              <a:buFont typeface="Arial" panose="020B0604020202020204" pitchFamily="34" charset="0"/>
+              <a:buChar char="•"/>
+              <a:defRPr sz="1800" kern="1200">
+                <a:solidFill>
+                  <a:schemeClr val="tx1"/>
+                </a:solidFill>
+                <a:latin typeface="+mn-lt"/>
+                <a:ea typeface="+mn-ea"/>
+                <a:cs typeface="+mn-cs"/>
+              </a:defRPr>
+            </a:lvl9pPr>
+          </a:lstStyle>
+          <a:p>
+            <a:r>
+              <a:rPr lang="en-US" dirty="0"/>
+              <a:t>User</a:t>
+            </a:r>
+          </a:p>
+          <a:p>
+            <a:pPr marL="342900" indent="-342900">
+              <a:buFont typeface="Arial" panose="020B0604020202020204" pitchFamily="34" charset="0"/>
+              <a:buChar char="•"/>
+            </a:pPr>
+            <a:r>
+              <a:rPr lang="en-US" dirty="0" err="1"/>
+              <a:t>TaskList</a:t>
+            </a:r>
+            <a:endParaRPr lang="en-US" dirty="0"/>
+          </a:p>
+          <a:p>
+            <a:pPr marL="342900" indent="-342900">
+              <a:buFont typeface="Arial" panose="020B0604020202020204" pitchFamily="34" charset="0"/>
+              <a:buChar char="•"/>
+            </a:pPr>
+            <a:r>
+              <a:rPr lang="en-US" dirty="0"/>
+              <a:t>Objectives</a:t>
+            </a:r>
+          </a:p>
+          <a:p>
+            <a:pPr marL="342900" indent="-342900">
+              <a:buFont typeface="Arial" panose="020B0604020202020204" pitchFamily="34" charset="0"/>
+              <a:buChar char="•"/>
+            </a:pPr>
+            <a:r>
+              <a:rPr lang="en-US" dirty="0"/>
+              <a:t>Inventory</a:t>
+            </a:r>
+          </a:p>
+          <a:p>
+            <a:pPr marL="342900" indent="-342900">
+              <a:buFont typeface="Arial" panose="020B0604020202020204" pitchFamily="34" charset="0"/>
+              <a:buChar char="•"/>
+            </a:pPr>
+            <a:r>
+              <a:rPr lang="en-US" dirty="0"/>
+              <a:t>Garden</a:t>
+            </a:r>
+          </a:p>
+          <a:p>
+            <a:pPr marL="342900" indent="-342900">
+              <a:buFont typeface="Arial" panose="020B0604020202020204" pitchFamily="34" charset="0"/>
+              <a:buChar char="•"/>
+            </a:pPr>
+            <a:r>
+              <a:rPr lang="en-US" dirty="0"/>
+              <a:t>Graphs</a:t>
+            </a:r>
+          </a:p>
+        </p:txBody>
+      </p:sp>
+      <p:sp>
+        <p:nvSpPr>
+          <p:cNvPr id="4" name="Title 1">
+            <a:extLst>
+              <a:ext uri="{FF2B5EF4-FFF2-40B4-BE49-F238E27FC236}">
+                <a16:creationId xmlns:a16="http://schemas.microsoft.com/office/drawing/2014/main" id="{12082F37-22EF-B3CA-23D3-6A9A1230F89D}"/>
+              </a:ext>
+            </a:extLst>
+          </p:cNvPr>
+          <p:cNvSpPr txBox="1">
+            <a:spLocks/>
+          </p:cNvSpPr>
+          <p:nvPr/>
+        </p:nvSpPr>
+        <p:spPr>
+          <a:xfrm>
+            <a:off x="515112" y="480567"/>
+            <a:ext cx="4287393" cy="2450593"/>
+          </a:xfrm>
+          <a:prstGeom prst="rect">
+            <a:avLst/>
+          </a:prstGeom>
+        </p:spPr>
+        <p:txBody>
+          <a:bodyPr/>
+          <a:lstStyle>
+            <a:lvl1pPr algn="l" defTabSz="914400" rtl="0" eaLnBrk="1" latinLnBrk="0" hangingPunct="1">
+              <a:lnSpc>
+                <a:spcPct val="100000"/>
+              </a:lnSpc>
+              <a:spcBef>
+                <a:spcPct val="0"/>
+              </a:spcBef>
+              <a:buNone/>
+              <a:defRPr sz="6600" kern="1200">
+                <a:solidFill>
+                  <a:schemeClr val="tx1"/>
+                </a:solidFill>
+                <a:latin typeface="+mj-lt"/>
+                <a:ea typeface="+mj-ea"/>
+                <a:cs typeface="+mj-cs"/>
+              </a:defRPr>
+            </a:lvl1pPr>
+          </a:lstStyle>
+          <a:p>
+            <a:r>
+              <a:rPr lang="en-US" sz="3000" dirty="0"/>
+              <a:t>Component Diagram</a:t>
+            </a:r>
+          </a:p>
+        </p:txBody>
+      </p:sp>
+    </p:spTree>
+    <p:extLst>
+      <p:ext uri="{BB962C8B-B14F-4D97-AF65-F5344CB8AC3E}">
+        <p14:creationId xmlns:p14="http://schemas.microsoft.com/office/powerpoint/2010/main" val="3493982357"/>
       </p:ext>
     </p:extLst>
   </p:cSld>

</xml_diff>